<commit_message>
Fixed a bug on Sorting
</commit_message>
<xml_diff>
--- a/exam/Exam Preparation.pptx
+++ b/exam/Exam Preparation.pptx
@@ -15754,18 +15754,10 @@
           <a:p>
             <a:pPr lvl="1"/>
             <a:r>
-              <a:rPr lang="de-DE" altLang="de-DE" dirty="0" err="1">
-                <a:solidFill>
-                  <a:schemeClr val="accent5"/>
-                </a:solidFill>
-              </a:rPr>
+              <a:rPr lang="de-DE" altLang="de-DE" dirty="0" err="1"/>
               <a:t>Bubblesort</a:t>
             </a:r>
-            <a:endParaRPr lang="de-DE" altLang="de-DE" dirty="0">
-              <a:solidFill>
-                <a:schemeClr val="accent5"/>
-              </a:solidFill>
-            </a:endParaRPr>
+            <a:endParaRPr lang="de-DE" altLang="de-DE" dirty="0"/>
           </a:p>
           <a:p>
             <a:pPr lvl="1"/>

</xml_diff>